<commit_message>
change to UI picture
</commit_message>
<xml_diff>
--- a/info-docs/UI.pptx
+++ b/info-docs/UI.pptx
@@ -9,7 +9,8 @@
     <p:sldId id="257" r:id="rId3"/>
     <p:sldId id="258" r:id="rId4"/>
     <p:sldId id="259" r:id="rId5"/>
-    <p:sldId id="260" r:id="rId6"/>
+    <p:sldId id="261" r:id="rId6"/>
+    <p:sldId id="260" r:id="rId7"/>
   </p:sldIdLst>
   <p:sldSz cx="12192000" cy="6858000"/>
   <p:notesSz cx="6858000" cy="9144000"/>
@@ -4649,6 +4650,897 @@
 </file>
 
 <file path=ppt/slides/slide5.xml><?xml version="1.0" encoding="utf-8"?>
+<p:sld xmlns:a="http://schemas.openxmlformats.org/drawingml/2006/main" xmlns:r="http://schemas.openxmlformats.org/officeDocument/2006/relationships" xmlns:p="http://schemas.openxmlformats.org/presentationml/2006/main">
+  <p:cSld>
+    <p:spTree>
+      <p:nvGrpSpPr>
+        <p:cNvPr id="1" name=""/>
+        <p:cNvGrpSpPr/>
+        <p:nvPr/>
+      </p:nvGrpSpPr>
+      <p:grpSpPr>
+        <a:xfrm>
+          <a:off x="0" y="0"/>
+          <a:ext cx="0" cy="0"/>
+          <a:chOff x="0" y="0"/>
+          <a:chExt cx="0" cy="0"/>
+        </a:xfrm>
+      </p:grpSpPr>
+      <p:sp>
+        <p:nvSpPr>
+          <p:cNvPr id="4" name="Rectangle 3">
+            <a:extLst>
+              <a:ext uri="{FF2B5EF4-FFF2-40B4-BE49-F238E27FC236}">
+                <a16:creationId xmlns:a16="http://schemas.microsoft.com/office/drawing/2014/main" id="{6A25CCBA-DFB8-4E6F-AC2B-7E42CBC03F84}"/>
+              </a:ext>
+            </a:extLst>
+          </p:cNvPr>
+          <p:cNvSpPr/>
+          <p:nvPr/>
+        </p:nvSpPr>
+        <p:spPr>
+          <a:xfrm>
+            <a:off x="620202" y="930302"/>
+            <a:ext cx="4170459" cy="2498697"/>
+          </a:xfrm>
+          <a:prstGeom prst="rect">
+            <a:avLst/>
+          </a:prstGeom>
+        </p:spPr>
+        <p:style>
+          <a:lnRef idx="2">
+            <a:schemeClr val="accent1">
+              <a:shade val="50000"/>
+            </a:schemeClr>
+          </a:lnRef>
+          <a:fillRef idx="1">
+            <a:schemeClr val="accent1"/>
+          </a:fillRef>
+          <a:effectRef idx="0">
+            <a:schemeClr val="accent1"/>
+          </a:effectRef>
+          <a:fontRef idx="minor">
+            <a:schemeClr val="lt1"/>
+          </a:fontRef>
+        </p:style>
+        <p:txBody>
+          <a:bodyPr rtlCol="0" anchor="ctr"/>
+          <a:lstStyle/>
+          <a:p>
+            <a:pPr algn="ctr"/>
+            <a:r>
+              <a:rPr lang="en-US" dirty="0"/>
+              <a:t>Video</a:t>
+            </a:r>
+          </a:p>
+        </p:txBody>
+      </p:sp>
+      <p:sp>
+        <p:nvSpPr>
+          <p:cNvPr id="5" name="Rectangle 4">
+            <a:extLst>
+              <a:ext uri="{FF2B5EF4-FFF2-40B4-BE49-F238E27FC236}">
+                <a16:creationId xmlns:a16="http://schemas.microsoft.com/office/drawing/2014/main" id="{3D367513-F399-4EAF-9C14-EF849E4D4855}"/>
+              </a:ext>
+            </a:extLst>
+          </p:cNvPr>
+          <p:cNvSpPr/>
+          <p:nvPr/>
+        </p:nvSpPr>
+        <p:spPr>
+          <a:xfrm>
+            <a:off x="5057029" y="1387502"/>
+            <a:ext cx="6547900" cy="5168347"/>
+          </a:xfrm>
+          <a:prstGeom prst="rect">
+            <a:avLst/>
+          </a:prstGeom>
+        </p:spPr>
+        <p:style>
+          <a:lnRef idx="2">
+            <a:schemeClr val="accent1">
+              <a:shade val="50000"/>
+            </a:schemeClr>
+          </a:lnRef>
+          <a:fillRef idx="1">
+            <a:schemeClr val="accent1"/>
+          </a:fillRef>
+          <a:effectRef idx="0">
+            <a:schemeClr val="accent1"/>
+          </a:effectRef>
+          <a:fontRef idx="minor">
+            <a:schemeClr val="lt1"/>
+          </a:fontRef>
+        </p:style>
+        <p:txBody>
+          <a:bodyPr rtlCol="0" anchor="ctr"/>
+          <a:lstStyle/>
+          <a:p>
+            <a:pPr algn="ctr"/>
+            <a:r>
+              <a:rPr lang="en-US"/>
+              <a:t>Pedestrian Tags</a:t>
+            </a:r>
+          </a:p>
+        </p:txBody>
+      </p:sp>
+      <p:sp>
+        <p:nvSpPr>
+          <p:cNvPr id="6" name="Rectangle 5">
+            <a:extLst>
+              <a:ext uri="{FF2B5EF4-FFF2-40B4-BE49-F238E27FC236}">
+                <a16:creationId xmlns:a16="http://schemas.microsoft.com/office/drawing/2014/main" id="{65C10306-F83C-4961-BBF2-E5ECF7D68EFE}"/>
+              </a:ext>
+            </a:extLst>
+          </p:cNvPr>
+          <p:cNvSpPr/>
+          <p:nvPr/>
+        </p:nvSpPr>
+        <p:spPr>
+          <a:xfrm>
+            <a:off x="620202" y="3550257"/>
+            <a:ext cx="4170459" cy="1367625"/>
+          </a:xfrm>
+          <a:prstGeom prst="rect">
+            <a:avLst/>
+          </a:prstGeom>
+        </p:spPr>
+        <p:style>
+          <a:lnRef idx="2">
+            <a:schemeClr val="accent1">
+              <a:shade val="50000"/>
+            </a:schemeClr>
+          </a:lnRef>
+          <a:fillRef idx="1">
+            <a:schemeClr val="accent1"/>
+          </a:fillRef>
+          <a:effectRef idx="0">
+            <a:schemeClr val="accent1"/>
+          </a:effectRef>
+          <a:fontRef idx="minor">
+            <a:schemeClr val="lt1"/>
+          </a:fontRef>
+        </p:style>
+        <p:txBody>
+          <a:bodyPr rtlCol="0" anchor="ctr"/>
+          <a:lstStyle/>
+          <a:p>
+            <a:pPr algn="ctr"/>
+            <a:r>
+              <a:rPr lang="en-US"/>
+              <a:t>Video navigation</a:t>
+            </a:r>
+          </a:p>
+        </p:txBody>
+      </p:sp>
+      <p:sp>
+        <p:nvSpPr>
+          <p:cNvPr id="7" name="Rectangle 6">
+            <a:extLst>
+              <a:ext uri="{FF2B5EF4-FFF2-40B4-BE49-F238E27FC236}">
+                <a16:creationId xmlns:a16="http://schemas.microsoft.com/office/drawing/2014/main" id="{ED9EE1DC-FB55-4DB4-B64C-5B737038CF97}"/>
+              </a:ext>
+            </a:extLst>
+          </p:cNvPr>
+          <p:cNvSpPr/>
+          <p:nvPr/>
+        </p:nvSpPr>
+        <p:spPr>
+          <a:xfrm>
+            <a:off x="5053054" y="930302"/>
+            <a:ext cx="1284136" cy="302150"/>
+          </a:xfrm>
+          <a:prstGeom prst="rect">
+            <a:avLst/>
+          </a:prstGeom>
+        </p:spPr>
+        <p:style>
+          <a:lnRef idx="2">
+            <a:schemeClr val="accent1">
+              <a:shade val="50000"/>
+            </a:schemeClr>
+          </a:lnRef>
+          <a:fillRef idx="1">
+            <a:schemeClr val="accent1"/>
+          </a:fillRef>
+          <a:effectRef idx="0">
+            <a:schemeClr val="accent1"/>
+          </a:effectRef>
+          <a:fontRef idx="minor">
+            <a:schemeClr val="lt1"/>
+          </a:fontRef>
+        </p:style>
+        <p:txBody>
+          <a:bodyPr rtlCol="0" anchor="ctr"/>
+          <a:lstStyle/>
+          <a:p>
+            <a:pPr algn="ctr"/>
+            <a:r>
+              <a:rPr lang="en-US" dirty="0"/>
+              <a:t>Pedestrian</a:t>
+            </a:r>
+          </a:p>
+        </p:txBody>
+      </p:sp>
+      <p:sp>
+        <p:nvSpPr>
+          <p:cNvPr id="8" name="Rectangle 7">
+            <a:extLst>
+              <a:ext uri="{FF2B5EF4-FFF2-40B4-BE49-F238E27FC236}">
+                <a16:creationId xmlns:a16="http://schemas.microsoft.com/office/drawing/2014/main" id="{A4183370-347B-48AC-BA0C-23750B929120}"/>
+              </a:ext>
+            </a:extLst>
+          </p:cNvPr>
+          <p:cNvSpPr/>
+          <p:nvPr/>
+        </p:nvSpPr>
+        <p:spPr>
+          <a:xfrm>
+            <a:off x="6414052" y="930302"/>
+            <a:ext cx="1284136" cy="302150"/>
+          </a:xfrm>
+          <a:prstGeom prst="rect">
+            <a:avLst/>
+          </a:prstGeom>
+        </p:spPr>
+        <p:style>
+          <a:lnRef idx="2">
+            <a:schemeClr val="accent1">
+              <a:shade val="50000"/>
+            </a:schemeClr>
+          </a:lnRef>
+          <a:fillRef idx="1">
+            <a:schemeClr val="accent1"/>
+          </a:fillRef>
+          <a:effectRef idx="0">
+            <a:schemeClr val="accent1"/>
+          </a:effectRef>
+          <a:fontRef idx="minor">
+            <a:schemeClr val="lt1"/>
+          </a:fontRef>
+        </p:style>
+        <p:txBody>
+          <a:bodyPr rtlCol="0" anchor="ctr"/>
+          <a:lstStyle/>
+          <a:p>
+            <a:pPr algn="ctr"/>
+            <a:r>
+              <a:rPr lang="en-US" dirty="0"/>
+              <a:t>Vehicle</a:t>
+            </a:r>
+          </a:p>
+        </p:txBody>
+      </p:sp>
+      <p:sp>
+        <p:nvSpPr>
+          <p:cNvPr id="9" name="Rectangle 8">
+            <a:extLst>
+              <a:ext uri="{FF2B5EF4-FFF2-40B4-BE49-F238E27FC236}">
+                <a16:creationId xmlns:a16="http://schemas.microsoft.com/office/drawing/2014/main" id="{E6ADE93E-02CE-42E2-BC86-5C7F8696BA2D}"/>
+              </a:ext>
+            </a:extLst>
+          </p:cNvPr>
+          <p:cNvSpPr/>
+          <p:nvPr/>
+        </p:nvSpPr>
+        <p:spPr>
+          <a:xfrm>
+            <a:off x="7775049" y="930302"/>
+            <a:ext cx="1500147" cy="302150"/>
+          </a:xfrm>
+          <a:prstGeom prst="rect">
+            <a:avLst/>
+          </a:prstGeom>
+        </p:spPr>
+        <p:style>
+          <a:lnRef idx="2">
+            <a:schemeClr val="accent1">
+              <a:shade val="50000"/>
+            </a:schemeClr>
+          </a:lnRef>
+          <a:fillRef idx="1">
+            <a:schemeClr val="accent1"/>
+          </a:fillRef>
+          <a:effectRef idx="0">
+            <a:schemeClr val="accent1"/>
+          </a:effectRef>
+          <a:fontRef idx="minor">
+            <a:schemeClr val="lt1"/>
+          </a:fontRef>
+        </p:style>
+        <p:txBody>
+          <a:bodyPr rtlCol="0" anchor="ctr"/>
+          <a:lstStyle/>
+          <a:p>
+            <a:pPr algn="ctr"/>
+            <a:r>
+              <a:rPr lang="en-US" dirty="0"/>
+              <a:t>Environment</a:t>
+            </a:r>
+          </a:p>
+        </p:txBody>
+      </p:sp>
+      <p:sp>
+        <p:nvSpPr>
+          <p:cNvPr id="10" name="Rectangle 9">
+            <a:extLst>
+              <a:ext uri="{FF2B5EF4-FFF2-40B4-BE49-F238E27FC236}">
+                <a16:creationId xmlns:a16="http://schemas.microsoft.com/office/drawing/2014/main" id="{F8BDB154-CE66-4DB9-BFEC-44D348335BFE}"/>
+              </a:ext>
+            </a:extLst>
+          </p:cNvPr>
+          <p:cNvSpPr/>
+          <p:nvPr/>
+        </p:nvSpPr>
+        <p:spPr>
+          <a:xfrm>
+            <a:off x="5169673" y="1877500"/>
+            <a:ext cx="1284136" cy="302150"/>
+          </a:xfrm>
+          <a:prstGeom prst="rect">
+            <a:avLst/>
+          </a:prstGeom>
+          <a:solidFill>
+            <a:schemeClr val="accent5">
+              <a:lumMod val="40000"/>
+              <a:lumOff val="60000"/>
+            </a:schemeClr>
+          </a:solidFill>
+        </p:spPr>
+        <p:style>
+          <a:lnRef idx="2">
+            <a:schemeClr val="accent1">
+              <a:shade val="50000"/>
+            </a:schemeClr>
+          </a:lnRef>
+          <a:fillRef idx="1">
+            <a:schemeClr val="accent1"/>
+          </a:fillRef>
+          <a:effectRef idx="0">
+            <a:schemeClr val="accent1"/>
+          </a:effectRef>
+          <a:fontRef idx="minor">
+            <a:schemeClr val="lt1"/>
+          </a:fontRef>
+        </p:style>
+        <p:txBody>
+          <a:bodyPr rtlCol="0" anchor="ctr"/>
+          <a:lstStyle/>
+          <a:p>
+            <a:pPr algn="ctr"/>
+            <a:r>
+              <a:rPr lang="en-US" dirty="0">
+                <a:solidFill>
+                  <a:schemeClr val="tx1"/>
+                </a:solidFill>
+              </a:rPr>
+              <a:t>Generic</a:t>
+            </a:r>
+          </a:p>
+        </p:txBody>
+      </p:sp>
+      <p:sp>
+        <p:nvSpPr>
+          <p:cNvPr id="11" name="Rectangle 10">
+            <a:extLst>
+              <a:ext uri="{FF2B5EF4-FFF2-40B4-BE49-F238E27FC236}">
+                <a16:creationId xmlns:a16="http://schemas.microsoft.com/office/drawing/2014/main" id="{A13295CD-E496-491E-8768-743BECDEADA5}"/>
+              </a:ext>
+            </a:extLst>
+          </p:cNvPr>
+          <p:cNvSpPr/>
+          <p:nvPr/>
+        </p:nvSpPr>
+        <p:spPr>
+          <a:xfrm>
+            <a:off x="6566453" y="1877500"/>
+            <a:ext cx="1284136" cy="302150"/>
+          </a:xfrm>
+          <a:prstGeom prst="rect">
+            <a:avLst/>
+          </a:prstGeom>
+          <a:solidFill>
+            <a:schemeClr val="accent5">
+              <a:lumMod val="40000"/>
+              <a:lumOff val="60000"/>
+            </a:schemeClr>
+          </a:solidFill>
+        </p:spPr>
+        <p:style>
+          <a:lnRef idx="2">
+            <a:schemeClr val="accent1">
+              <a:shade val="50000"/>
+            </a:schemeClr>
+          </a:lnRef>
+          <a:fillRef idx="1">
+            <a:schemeClr val="accent1"/>
+          </a:fillRef>
+          <a:effectRef idx="0">
+            <a:schemeClr val="accent1"/>
+          </a:effectRef>
+          <a:fontRef idx="minor">
+            <a:schemeClr val="lt1"/>
+          </a:fontRef>
+        </p:style>
+        <p:txBody>
+          <a:bodyPr rtlCol="0" anchor="ctr"/>
+          <a:lstStyle/>
+          <a:p>
+            <a:pPr algn="ctr"/>
+            <a:r>
+              <a:rPr lang="en-US" dirty="0">
+                <a:solidFill>
+                  <a:schemeClr val="tx1"/>
+                </a:solidFill>
+              </a:rPr>
+              <a:t>Instant</a:t>
+            </a:r>
+          </a:p>
+        </p:txBody>
+      </p:sp>
+      <p:sp>
+        <p:nvSpPr>
+          <p:cNvPr id="12" name="Rectangle 11">
+            <a:extLst>
+              <a:ext uri="{FF2B5EF4-FFF2-40B4-BE49-F238E27FC236}">
+                <a16:creationId xmlns:a16="http://schemas.microsoft.com/office/drawing/2014/main" id="{A46A936A-EFC7-4C09-98F0-174F931F120B}"/>
+              </a:ext>
+            </a:extLst>
+          </p:cNvPr>
+          <p:cNvSpPr/>
+          <p:nvPr/>
+        </p:nvSpPr>
+        <p:spPr>
+          <a:xfrm>
+            <a:off x="7931428" y="1877500"/>
+            <a:ext cx="1284136" cy="302150"/>
+          </a:xfrm>
+          <a:prstGeom prst="rect">
+            <a:avLst/>
+          </a:prstGeom>
+          <a:solidFill>
+            <a:schemeClr val="accent5">
+              <a:lumMod val="40000"/>
+              <a:lumOff val="60000"/>
+            </a:schemeClr>
+          </a:solidFill>
+        </p:spPr>
+        <p:style>
+          <a:lnRef idx="2">
+            <a:schemeClr val="accent1">
+              <a:shade val="50000"/>
+            </a:schemeClr>
+          </a:lnRef>
+          <a:fillRef idx="1">
+            <a:schemeClr val="accent1"/>
+          </a:fillRef>
+          <a:effectRef idx="0">
+            <a:schemeClr val="accent1"/>
+          </a:effectRef>
+          <a:fontRef idx="minor">
+            <a:schemeClr val="lt1"/>
+          </a:fontRef>
+        </p:style>
+        <p:txBody>
+          <a:bodyPr rtlCol="0" anchor="ctr"/>
+          <a:lstStyle/>
+          <a:p>
+            <a:pPr algn="ctr"/>
+            <a:r>
+              <a:rPr lang="en-US" dirty="0">
+                <a:solidFill>
+                  <a:schemeClr val="tx1"/>
+                </a:solidFill>
+              </a:rPr>
+              <a:t>Collisions</a:t>
+            </a:r>
+          </a:p>
+        </p:txBody>
+      </p:sp>
+      <p:sp>
+        <p:nvSpPr>
+          <p:cNvPr id="13" name="Rectangle 12">
+            <a:extLst>
+              <a:ext uri="{FF2B5EF4-FFF2-40B4-BE49-F238E27FC236}">
+                <a16:creationId xmlns:a16="http://schemas.microsoft.com/office/drawing/2014/main" id="{83A1A2DE-B6FC-40CA-B46C-A4B001AAFDFB}"/>
+              </a:ext>
+            </a:extLst>
+          </p:cNvPr>
+          <p:cNvSpPr/>
+          <p:nvPr/>
+        </p:nvSpPr>
+        <p:spPr>
+          <a:xfrm>
+            <a:off x="5169673" y="1482918"/>
+            <a:ext cx="2062038" cy="239531"/>
+          </a:xfrm>
+          <a:prstGeom prst="rect">
+            <a:avLst/>
+          </a:prstGeom>
+          <a:solidFill>
+            <a:schemeClr val="bg2"/>
+          </a:solidFill>
+        </p:spPr>
+        <p:style>
+          <a:lnRef idx="2">
+            <a:schemeClr val="accent1">
+              <a:shade val="50000"/>
+            </a:schemeClr>
+          </a:lnRef>
+          <a:fillRef idx="1">
+            <a:schemeClr val="accent1"/>
+          </a:fillRef>
+          <a:effectRef idx="0">
+            <a:schemeClr val="accent1"/>
+          </a:effectRef>
+          <a:fontRef idx="minor">
+            <a:schemeClr val="lt1"/>
+          </a:fontRef>
+        </p:style>
+        <p:txBody>
+          <a:bodyPr rtlCol="0" anchor="ctr"/>
+          <a:lstStyle/>
+          <a:p>
+            <a:pPr algn="ctr"/>
+            <a:r>
+              <a:rPr lang="en-US" dirty="0">
+                <a:solidFill>
+                  <a:schemeClr val="tx1"/>
+                </a:solidFill>
+              </a:rPr>
+              <a:t>Search</a:t>
+            </a:r>
+          </a:p>
+        </p:txBody>
+      </p:sp>
+      <p:grpSp>
+        <p:nvGrpSpPr>
+          <p:cNvPr id="16" name="Group 15">
+            <a:extLst>
+              <a:ext uri="{FF2B5EF4-FFF2-40B4-BE49-F238E27FC236}">
+                <a16:creationId xmlns:a16="http://schemas.microsoft.com/office/drawing/2014/main" id="{95472C33-A107-49AC-B97B-E8BEFDC01E02}"/>
+              </a:ext>
+            </a:extLst>
+          </p:cNvPr>
+          <p:cNvGrpSpPr/>
+          <p:nvPr/>
+        </p:nvGrpSpPr>
+        <p:grpSpPr>
+          <a:xfrm>
+            <a:off x="7498079" y="1506276"/>
+            <a:ext cx="1147641" cy="207726"/>
+            <a:chOff x="7498079" y="1506276"/>
+            <a:chExt cx="1147641" cy="207726"/>
+          </a:xfrm>
+        </p:grpSpPr>
+        <p:sp>
+          <p:nvSpPr>
+            <p:cNvPr id="14" name="Rectangle 13">
+              <a:extLst>
+                <a:ext uri="{FF2B5EF4-FFF2-40B4-BE49-F238E27FC236}">
+                  <a16:creationId xmlns:a16="http://schemas.microsoft.com/office/drawing/2014/main" id="{90E7E2A3-8436-44C6-9029-B66665DC23C9}"/>
+                </a:ext>
+              </a:extLst>
+            </p:cNvPr>
+            <p:cNvSpPr/>
+            <p:nvPr/>
+          </p:nvSpPr>
+          <p:spPr>
+            <a:xfrm>
+              <a:off x="7498079" y="1542553"/>
+              <a:ext cx="143124" cy="135172"/>
+            </a:xfrm>
+            <a:prstGeom prst="rect">
+              <a:avLst/>
+            </a:prstGeom>
+            <a:solidFill>
+              <a:schemeClr val="bg2"/>
+            </a:solidFill>
+          </p:spPr>
+          <p:style>
+            <a:lnRef idx="2">
+              <a:schemeClr val="accent1">
+                <a:shade val="50000"/>
+              </a:schemeClr>
+            </a:lnRef>
+            <a:fillRef idx="1">
+              <a:schemeClr val="accent1"/>
+            </a:fillRef>
+            <a:effectRef idx="0">
+              <a:schemeClr val="accent1"/>
+            </a:effectRef>
+            <a:fontRef idx="minor">
+              <a:schemeClr val="lt1"/>
+            </a:fontRef>
+          </p:style>
+          <p:txBody>
+            <a:bodyPr rtlCol="0" anchor="ctr"/>
+            <a:lstStyle/>
+            <a:p>
+              <a:pPr algn="ctr"/>
+              <a:endParaRPr lang="en-US"/>
+            </a:p>
+          </p:txBody>
+        </p:sp>
+        <p:sp>
+          <p:nvSpPr>
+            <p:cNvPr id="15" name="Rectangle 14">
+              <a:extLst>
+                <a:ext uri="{FF2B5EF4-FFF2-40B4-BE49-F238E27FC236}">
+                  <a16:creationId xmlns:a16="http://schemas.microsoft.com/office/drawing/2014/main" id="{CC1DF97B-AF37-4D2F-BB0C-09809C781703}"/>
+                </a:ext>
+              </a:extLst>
+            </p:cNvPr>
+            <p:cNvSpPr/>
+            <p:nvPr/>
+          </p:nvSpPr>
+          <p:spPr>
+            <a:xfrm>
+              <a:off x="7698188" y="1506276"/>
+              <a:ext cx="947532" cy="207726"/>
+            </a:xfrm>
+            <a:prstGeom prst="rect">
+              <a:avLst/>
+            </a:prstGeom>
+          </p:spPr>
+          <p:style>
+            <a:lnRef idx="2">
+              <a:schemeClr val="accent1">
+                <a:shade val="50000"/>
+              </a:schemeClr>
+            </a:lnRef>
+            <a:fillRef idx="1">
+              <a:schemeClr val="accent1"/>
+            </a:fillRef>
+            <a:effectRef idx="0">
+              <a:schemeClr val="accent1"/>
+            </a:effectRef>
+            <a:fontRef idx="minor">
+              <a:schemeClr val="lt1"/>
+            </a:fontRef>
+          </p:style>
+          <p:txBody>
+            <a:bodyPr rtlCol="0" anchor="ctr"/>
+            <a:lstStyle/>
+            <a:p>
+              <a:r>
+                <a:rPr lang="en-US"/>
+                <a:t>stop</a:t>
+              </a:r>
+            </a:p>
+          </p:txBody>
+        </p:sp>
+      </p:grpSp>
+      <p:grpSp>
+        <p:nvGrpSpPr>
+          <p:cNvPr id="17" name="Group 16">
+            <a:extLst>
+              <a:ext uri="{FF2B5EF4-FFF2-40B4-BE49-F238E27FC236}">
+                <a16:creationId xmlns:a16="http://schemas.microsoft.com/office/drawing/2014/main" id="{FD03DF57-15DD-41DA-BE06-3653A049F862}"/>
+              </a:ext>
+            </a:extLst>
+          </p:cNvPr>
+          <p:cNvGrpSpPr/>
+          <p:nvPr/>
+        </p:nvGrpSpPr>
+        <p:grpSpPr>
+          <a:xfrm>
+            <a:off x="8834562" y="1514723"/>
+            <a:ext cx="1147641" cy="207726"/>
+            <a:chOff x="7498079" y="1506276"/>
+            <a:chExt cx="1147641" cy="207726"/>
+          </a:xfrm>
+        </p:grpSpPr>
+        <p:sp>
+          <p:nvSpPr>
+            <p:cNvPr id="18" name="Rectangle 17">
+              <a:extLst>
+                <a:ext uri="{FF2B5EF4-FFF2-40B4-BE49-F238E27FC236}">
+                  <a16:creationId xmlns:a16="http://schemas.microsoft.com/office/drawing/2014/main" id="{BFCF4E4A-0740-4E0C-8ACC-B41A6A1300D8}"/>
+                </a:ext>
+              </a:extLst>
+            </p:cNvPr>
+            <p:cNvSpPr/>
+            <p:nvPr/>
+          </p:nvSpPr>
+          <p:spPr>
+            <a:xfrm>
+              <a:off x="7498079" y="1542553"/>
+              <a:ext cx="143124" cy="135172"/>
+            </a:xfrm>
+            <a:prstGeom prst="rect">
+              <a:avLst/>
+            </a:prstGeom>
+            <a:solidFill>
+              <a:schemeClr val="bg2"/>
+            </a:solidFill>
+          </p:spPr>
+          <p:style>
+            <a:lnRef idx="2">
+              <a:schemeClr val="accent1">
+                <a:shade val="50000"/>
+              </a:schemeClr>
+            </a:lnRef>
+            <a:fillRef idx="1">
+              <a:schemeClr val="accent1"/>
+            </a:fillRef>
+            <a:effectRef idx="0">
+              <a:schemeClr val="accent1"/>
+            </a:effectRef>
+            <a:fontRef idx="minor">
+              <a:schemeClr val="lt1"/>
+            </a:fontRef>
+          </p:style>
+          <p:txBody>
+            <a:bodyPr rtlCol="0" anchor="ctr"/>
+            <a:lstStyle/>
+            <a:p>
+              <a:pPr algn="ctr"/>
+              <a:endParaRPr lang="en-US"/>
+            </a:p>
+          </p:txBody>
+        </p:sp>
+        <p:sp>
+          <p:nvSpPr>
+            <p:cNvPr id="19" name="Rectangle 18">
+              <a:extLst>
+                <a:ext uri="{FF2B5EF4-FFF2-40B4-BE49-F238E27FC236}">
+                  <a16:creationId xmlns:a16="http://schemas.microsoft.com/office/drawing/2014/main" id="{D47A02E1-487B-4A9D-9C43-65E66F444E21}"/>
+                </a:ext>
+              </a:extLst>
+            </p:cNvPr>
+            <p:cNvSpPr/>
+            <p:nvPr/>
+          </p:nvSpPr>
+          <p:spPr>
+            <a:xfrm>
+              <a:off x="7698188" y="1506276"/>
+              <a:ext cx="947532" cy="207726"/>
+            </a:xfrm>
+            <a:prstGeom prst="rect">
+              <a:avLst/>
+            </a:prstGeom>
+          </p:spPr>
+          <p:style>
+            <a:lnRef idx="2">
+              <a:schemeClr val="accent1">
+                <a:shade val="50000"/>
+              </a:schemeClr>
+            </a:lnRef>
+            <a:fillRef idx="1">
+              <a:schemeClr val="accent1"/>
+            </a:fillRef>
+            <a:effectRef idx="0">
+              <a:schemeClr val="accent1"/>
+            </a:effectRef>
+            <a:fontRef idx="minor">
+              <a:schemeClr val="lt1"/>
+            </a:fontRef>
+          </p:style>
+          <p:txBody>
+            <a:bodyPr rtlCol="0" anchor="ctr"/>
+            <a:lstStyle/>
+            <a:p>
+              <a:r>
+                <a:rPr lang="en-US"/>
+                <a:t>run</a:t>
+              </a:r>
+            </a:p>
+          </p:txBody>
+        </p:sp>
+      </p:grpSp>
+      <p:sp>
+        <p:nvSpPr>
+          <p:cNvPr id="20" name="Rectangle 19">
+            <a:extLst>
+              <a:ext uri="{FF2B5EF4-FFF2-40B4-BE49-F238E27FC236}">
+                <a16:creationId xmlns:a16="http://schemas.microsoft.com/office/drawing/2014/main" id="{812A30CD-30E9-4D1F-9A83-A0B274D12DD4}"/>
+              </a:ext>
+            </a:extLst>
+          </p:cNvPr>
+          <p:cNvSpPr/>
+          <p:nvPr/>
+        </p:nvSpPr>
+        <p:spPr>
+          <a:xfrm>
+            <a:off x="620202" y="5092810"/>
+            <a:ext cx="4170459" cy="1463040"/>
+          </a:xfrm>
+          <a:prstGeom prst="rect">
+            <a:avLst/>
+          </a:prstGeom>
+        </p:spPr>
+        <p:style>
+          <a:lnRef idx="2">
+            <a:schemeClr val="accent1">
+              <a:shade val="50000"/>
+            </a:schemeClr>
+          </a:lnRef>
+          <a:fillRef idx="1">
+            <a:schemeClr val="accent1"/>
+          </a:fillRef>
+          <a:effectRef idx="0">
+            <a:schemeClr val="accent1"/>
+          </a:effectRef>
+          <a:fontRef idx="minor">
+            <a:schemeClr val="lt1"/>
+          </a:fontRef>
+        </p:style>
+        <p:txBody>
+          <a:bodyPr rtlCol="0" anchor="ctr"/>
+          <a:lstStyle/>
+          <a:p>
+            <a:pPr algn="ctr"/>
+            <a:r>
+              <a:rPr lang="en-US"/>
+              <a:t>Current annotations</a:t>
+            </a:r>
+          </a:p>
+        </p:txBody>
+      </p:sp>
+      <p:sp>
+        <p:nvSpPr>
+          <p:cNvPr id="23" name="Rectangle 22">
+            <a:extLst>
+              <a:ext uri="{FF2B5EF4-FFF2-40B4-BE49-F238E27FC236}">
+                <a16:creationId xmlns:a16="http://schemas.microsoft.com/office/drawing/2014/main" id="{9A146A4B-1468-45DD-B2DA-BAC472A2A344}"/>
+              </a:ext>
+            </a:extLst>
+          </p:cNvPr>
+          <p:cNvSpPr/>
+          <p:nvPr/>
+        </p:nvSpPr>
+        <p:spPr>
+          <a:xfrm>
+            <a:off x="9352058" y="930302"/>
+            <a:ext cx="2252872" cy="302150"/>
+          </a:xfrm>
+          <a:prstGeom prst="rect">
+            <a:avLst/>
+          </a:prstGeom>
+        </p:spPr>
+        <p:style>
+          <a:lnRef idx="2">
+            <a:schemeClr val="accent1">
+              <a:shade val="50000"/>
+            </a:schemeClr>
+          </a:lnRef>
+          <a:fillRef idx="1">
+            <a:schemeClr val="accent1"/>
+          </a:fillRef>
+          <a:effectRef idx="0">
+            <a:schemeClr val="accent1"/>
+          </a:effectRef>
+          <a:fontRef idx="minor">
+            <a:schemeClr val="lt1"/>
+          </a:fontRef>
+        </p:style>
+        <p:txBody>
+          <a:bodyPr rtlCol="0" anchor="ctr"/>
+          <a:lstStyle/>
+          <a:p>
+            <a:pPr algn="ctr"/>
+            <a:r>
+              <a:rPr lang="en-US" dirty="0"/>
+              <a:t>Show All Annotations</a:t>
+            </a:r>
+          </a:p>
+        </p:txBody>
+      </p:sp>
+    </p:spTree>
+    <p:extLst>
+      <p:ext uri="{BB962C8B-B14F-4D97-AF65-F5344CB8AC3E}">
+        <p14:creationId xmlns:p14="http://schemas.microsoft.com/office/powerpoint/2010/main" val="130130174"/>
+      </p:ext>
+    </p:extLst>
+  </p:cSld>
+  <p:clrMapOvr>
+    <a:masterClrMapping/>
+  </p:clrMapOvr>
+</p:sld>
+</file>
+
+<file path=ppt/slides/slide6.xml><?xml version="1.0" encoding="utf-8"?>
 <p:sld xmlns:a="http://schemas.openxmlformats.org/drawingml/2006/main" xmlns:r="http://schemas.openxmlformats.org/officeDocument/2006/relationships" xmlns:p="http://schemas.openxmlformats.org/presentationml/2006/main">
   <p:cSld>
     <p:spTree>

</xml_diff>